<commit_message>
Added FA logisim circuits
</commit_message>
<xml_diff>
--- a/lectures/weekly_slides/M1.3_Mult_Div/M1.3_Mult_Div.pptx
+++ b/lectures/weekly_slides/M1.3_Mult_Div/M1.3_Mult_Div.pptx
@@ -3046,7 +3046,7 @@
           <a:p>
             <a:fld id="{0B9AF00C-6D75-48A8-A194-B96D46F0E30B}" type="datetimeFigureOut">
               <a:rPr lang="en-US" smtClean="0"/>
-              <a:t>10/27/2021</a:t>
+              <a:t>11/4/2021</a:t>
             </a:fld>
             <a:endParaRPr lang="en-US"/>
           </a:p>
@@ -3238,7 +3238,7 @@
               <a:pPr>
                 <a:defRPr/>
               </a:pPr>
-              <a:t>10/27/2021</a:t>
+              <a:t>11/4/2021</a:t>
             </a:fld>
             <a:endParaRPr lang="en-US"/>
           </a:p>
@@ -3876,7 +3876,7 @@
                 <a:latin typeface="Times New Roman" panose="02020603050405020304" pitchFamily="18" charset="0"/>
               </a:rPr>
               <a:pPr/>
-              <a:t>27 October, 2021</a:t>
+              <a:t>4 November, 2021</a:t>
             </a:fld>
             <a:endParaRPr lang="en-AU" altLang="en-US">
               <a:latin typeface="Times New Roman" panose="02020603050405020304" pitchFamily="18" charset="0"/>
@@ -4572,7 +4572,7 @@
                 <a:latin typeface="Times New Roman" panose="02020603050405020304" pitchFamily="18" charset="0"/>
               </a:rPr>
               <a:pPr/>
-              <a:t>27 October, 2021</a:t>
+              <a:t>4 November, 2021</a:t>
             </a:fld>
             <a:endParaRPr lang="en-AU" altLang="en-US">
               <a:latin typeface="Times New Roman" panose="02020603050405020304" pitchFamily="18" charset="0"/>
@@ -5268,7 +5268,7 @@
                 <a:latin typeface="Times New Roman" panose="02020603050405020304" pitchFamily="18" charset="0"/>
               </a:rPr>
               <a:pPr/>
-              <a:t>27 October, 2021</a:t>
+              <a:t>4 November, 2021</a:t>
             </a:fld>
             <a:endParaRPr lang="en-AU" altLang="en-US">
               <a:latin typeface="Times New Roman" panose="02020603050405020304" pitchFamily="18" charset="0"/>
@@ -5964,7 +5964,7 @@
                 <a:latin typeface="Times New Roman" panose="02020603050405020304" pitchFamily="18" charset="0"/>
               </a:rPr>
               <a:pPr/>
-              <a:t>27 October, 2021</a:t>
+              <a:t>4 November, 2021</a:t>
             </a:fld>
             <a:endParaRPr lang="en-AU" altLang="en-US">
               <a:latin typeface="Times New Roman" panose="02020603050405020304" pitchFamily="18" charset="0"/>
@@ -6660,7 +6660,7 @@
                 <a:latin typeface="Times New Roman" panose="02020603050405020304" pitchFamily="18" charset="0"/>
               </a:rPr>
               <a:pPr/>
-              <a:t>27 October, 2021</a:t>
+              <a:t>4 November, 2021</a:t>
             </a:fld>
             <a:endParaRPr lang="en-AU" altLang="en-US">
               <a:latin typeface="Times New Roman" panose="02020603050405020304" pitchFamily="18" charset="0"/>
@@ -7356,7 +7356,7 @@
                 <a:latin typeface="Times New Roman" panose="02020603050405020304" pitchFamily="18" charset="0"/>
               </a:rPr>
               <a:pPr/>
-              <a:t>27 October, 2021</a:t>
+              <a:t>4 November, 2021</a:t>
             </a:fld>
             <a:endParaRPr lang="en-AU" altLang="en-US">
               <a:latin typeface="Times New Roman" panose="02020603050405020304" pitchFamily="18" charset="0"/>
@@ -8052,7 +8052,7 @@
                 <a:latin typeface="Times New Roman" panose="02020603050405020304" pitchFamily="18" charset="0"/>
               </a:rPr>
               <a:pPr/>
-              <a:t>27 October, 2021</a:t>
+              <a:t>4 November, 2021</a:t>
             </a:fld>
             <a:endParaRPr lang="en-AU" altLang="en-US">
               <a:latin typeface="Times New Roman" panose="02020603050405020304" pitchFamily="18" charset="0"/>
@@ -8748,7 +8748,7 @@
                 <a:latin typeface="Times New Roman" panose="02020603050405020304" pitchFamily="18" charset="0"/>
               </a:rPr>
               <a:pPr/>
-              <a:t>27 October, 2021</a:t>
+              <a:t>4 November, 2021</a:t>
             </a:fld>
             <a:endParaRPr lang="en-AU" altLang="en-US">
               <a:latin typeface="Times New Roman" panose="02020603050405020304" pitchFamily="18" charset="0"/>
@@ -9444,7 +9444,7 @@
                 <a:latin typeface="Times New Roman" panose="02020603050405020304" pitchFamily="18" charset="0"/>
               </a:rPr>
               <a:pPr/>
-              <a:t>27 October, 2021</a:t>
+              <a:t>4 November, 2021</a:t>
             </a:fld>
             <a:endParaRPr lang="en-AU" altLang="en-US">
               <a:latin typeface="Times New Roman" panose="02020603050405020304" pitchFamily="18" charset="0"/>
@@ -10140,7 +10140,7 @@
                 <a:latin typeface="Times New Roman" panose="02020603050405020304" pitchFamily="18" charset="0"/>
               </a:rPr>
               <a:pPr/>
-              <a:t>27 October, 2021</a:t>
+              <a:t>4 November, 2021</a:t>
             </a:fld>
             <a:endParaRPr lang="en-AU" altLang="en-US">
               <a:latin typeface="Times New Roman" panose="02020603050405020304" pitchFamily="18" charset="0"/>
@@ -10836,7 +10836,7 @@
                 <a:latin typeface="Times New Roman" panose="02020603050405020304" pitchFamily="18" charset="0"/>
               </a:rPr>
               <a:pPr/>
-              <a:t>27 October, 2021</a:t>
+              <a:t>4 November, 2021</a:t>
             </a:fld>
             <a:endParaRPr lang="en-AU" altLang="en-US">
               <a:latin typeface="Times New Roman" panose="02020603050405020304" pitchFamily="18" charset="0"/>
@@ -11532,7 +11532,7 @@
                 <a:latin typeface="Times New Roman" panose="02020603050405020304" pitchFamily="18" charset="0"/>
               </a:rPr>
               <a:pPr/>
-              <a:t>27 October, 2021</a:t>
+              <a:t>4 November, 2021</a:t>
             </a:fld>
             <a:endParaRPr lang="en-AU" altLang="en-US">
               <a:latin typeface="Times New Roman" panose="02020603050405020304" pitchFamily="18" charset="0"/>
@@ -12235,7 +12235,7 @@
               <a:pPr>
                 <a:defRPr/>
               </a:pPr>
-              <a:t>10/27/2021</a:t>
+              <a:t>11/4/2021</a:t>
             </a:fld>
             <a:endParaRPr lang="en-US"/>
           </a:p>
@@ -13992,7 +13992,7 @@
           <a:p>
             <a:fld id="{A35C81D1-1CD0-4635-879D-7FA4B608ED76}" type="datetimeFigureOut">
               <a:rPr lang="en-GB" smtClean="0"/>
-              <a:t>27/10/2021</a:t>
+              <a:t>04/11/2021</a:t>
             </a:fld>
             <a:endParaRPr lang="en-GB"/>
           </a:p>
@@ -14581,7 +14581,7 @@
               <a:pPr>
                 <a:defRPr/>
               </a:pPr>
-              <a:t>10/27/2021</a:t>
+              <a:t>11/4/2021</a:t>
             </a:fld>
             <a:endParaRPr lang="en-US"/>
           </a:p>
@@ -16059,7 +16059,7 @@
           <a:graphicData uri="http://schemas.openxmlformats.org/presentationml/2006/ole">
             <mc:AlternateContent xmlns:mc="http://schemas.openxmlformats.org/markup-compatibility/2006">
               <mc:Choice xmlns:v="urn:schemas-microsoft-com:vml" Requires="v">
-                <p:oleObj spid="_x0000_s1029" name="VISIO" r:id="rId4" imgW="2223360" imgH="1461600" progId="Visio.Drawing.6">
+                <p:oleObj spid="_x0000_s1026" name="VISIO" r:id="rId4" imgW="2223360" imgH="1461600" progId="Visio.Drawing.6">
                   <p:embed/>
                 </p:oleObj>
               </mc:Choice>
@@ -16068,7 +16068,13 @@
                   <p:embed/>
                   <p:pic>
                     <p:nvPicPr>
-                      <p:cNvPr id="946183" name="Object 7"/>
+                      <p:cNvPr id="5" name="Object 7">
+                        <a:extLst>
+                          <a:ext uri="{FF2B5EF4-FFF2-40B4-BE49-F238E27FC236}">
+                            <a16:creationId xmlns:a16="http://schemas.microsoft.com/office/drawing/2014/main" id="{34B2D0CC-E0A9-4FC6-9EF7-5CBF77D9597C}"/>
+                          </a:ext>
+                        </a:extLst>
+                      </p:cNvPr>
                       <p:cNvPicPr>
                         <a:picLocks noChangeAspect="1" noChangeArrowheads="1"/>
                       </p:cNvPicPr>
@@ -29180,7 +29186,7 @@
             </a:pPr>
             <a:r>
               <a:rPr lang="en-GB" dirty="0"/>
-              <a:t>Alternatively, previous algorithm works for signed numbers as long as shifts are performed using sign extension.</a:t>
+              <a:t>Alternatively, previous algorithm works for signed numbers if shifts are performed using sign extension.</a:t>
             </a:r>
           </a:p>
         </p:txBody>
@@ -31979,6 +31985,81 @@
   <p:clrMapOvr>
     <a:masterClrMapping/>
   </p:clrMapOvr>
+  <p:timing>
+    <p:tnLst>
+      <p:par>
+        <p:cTn id="1" dur="indefinite" restart="never" nodeType="tmRoot">
+          <p:childTnLst>
+            <p:seq concurrent="1" nextAc="seek">
+              <p:cTn id="2" dur="indefinite" nodeType="mainSeq">
+                <p:childTnLst>
+                  <p:par>
+                    <p:cTn id="3" fill="hold">
+                      <p:stCondLst>
+                        <p:cond delay="indefinite"/>
+                      </p:stCondLst>
+                      <p:childTnLst>
+                        <p:par>
+                          <p:cTn id="4" fill="hold">
+                            <p:stCondLst>
+                              <p:cond delay="0"/>
+                            </p:stCondLst>
+                            <p:childTnLst>
+                              <p:par>
+                                <p:cTn id="5" presetID="1" presetClass="entr" presetSubtype="0" fill="hold" nodeType="clickEffect">
+                                  <p:stCondLst>
+                                    <p:cond delay="0"/>
+                                  </p:stCondLst>
+                                  <p:childTnLst>
+                                    <p:set>
+                                      <p:cBhvr>
+                                        <p:cTn id="6" dur="1" fill="hold">
+                                          <p:stCondLst>
+                                            <p:cond delay="0"/>
+                                          </p:stCondLst>
+                                        </p:cTn>
+                                        <p:tgtEl>
+                                          <p:spTgt spid="6"/>
+                                        </p:tgtEl>
+                                        <p:attrNameLst>
+                                          <p:attrName>style.visibility</p:attrName>
+                                        </p:attrNameLst>
+                                      </p:cBhvr>
+                                      <p:to>
+                                        <p:strVal val="visible"/>
+                                      </p:to>
+                                    </p:set>
+                                  </p:childTnLst>
+                                </p:cTn>
+                              </p:par>
+                            </p:childTnLst>
+                          </p:cTn>
+                        </p:par>
+                      </p:childTnLst>
+                    </p:cTn>
+                  </p:par>
+                </p:childTnLst>
+              </p:cTn>
+              <p:prevCondLst>
+                <p:cond evt="onPrev" delay="0">
+                  <p:tgtEl>
+                    <p:sldTgt/>
+                  </p:tgtEl>
+                </p:cond>
+              </p:prevCondLst>
+              <p:nextCondLst>
+                <p:cond evt="onNext" delay="0">
+                  <p:tgtEl>
+                    <p:sldTgt/>
+                  </p:tgtEl>
+                </p:cond>
+              </p:nextCondLst>
+            </p:seq>
+          </p:childTnLst>
+        </p:cTn>
+      </p:par>
+    </p:tnLst>
+  </p:timing>
 </p:sld>
 </file>
 
@@ -32432,6 +32513,111 @@
   <p:clrMapOvr>
     <a:masterClrMapping/>
   </p:clrMapOvr>
+  <p:timing>
+    <p:tnLst>
+      <p:par>
+        <p:cTn id="1" dur="indefinite" restart="never" nodeType="tmRoot">
+          <p:childTnLst>
+            <p:seq concurrent="1" nextAc="seek">
+              <p:cTn id="2" dur="indefinite" nodeType="mainSeq">
+                <p:childTnLst>
+                  <p:par>
+                    <p:cTn id="3" fill="hold">
+                      <p:stCondLst>
+                        <p:cond delay="indefinite"/>
+                      </p:stCondLst>
+                      <p:childTnLst>
+                        <p:par>
+                          <p:cTn id="4" fill="hold">
+                            <p:stCondLst>
+                              <p:cond delay="0"/>
+                            </p:stCondLst>
+                            <p:childTnLst>
+                              <p:par>
+                                <p:cTn id="5" presetID="1" presetClass="entr" presetSubtype="0" fill="hold" nodeType="clickEffect">
+                                  <p:stCondLst>
+                                    <p:cond delay="0"/>
+                                  </p:stCondLst>
+                                  <p:childTnLst>
+                                    <p:set>
+                                      <p:cBhvr>
+                                        <p:cTn id="6" dur="1" fill="hold">
+                                          <p:stCondLst>
+                                            <p:cond delay="0"/>
+                                          </p:stCondLst>
+                                        </p:cTn>
+                                        <p:tgtEl>
+                                          <p:spTgt spid="8"/>
+                                        </p:tgtEl>
+                                        <p:attrNameLst>
+                                          <p:attrName>style.visibility</p:attrName>
+                                        </p:attrNameLst>
+                                      </p:cBhvr>
+                                      <p:to>
+                                        <p:strVal val="visible"/>
+                                      </p:to>
+                                    </p:set>
+                                  </p:childTnLst>
+                                </p:cTn>
+                              </p:par>
+                              <p:par>
+                                <p:cTn id="7" presetID="1" presetClass="entr" presetSubtype="0" fill="hold" grpId="0" nodeType="withEffect">
+                                  <p:stCondLst>
+                                    <p:cond delay="0"/>
+                                  </p:stCondLst>
+                                  <p:childTnLst>
+                                    <p:set>
+                                      <p:cBhvr>
+                                        <p:cTn id="8" dur="1" fill="hold">
+                                          <p:stCondLst>
+                                            <p:cond delay="0"/>
+                                          </p:stCondLst>
+                                        </p:cTn>
+                                        <p:tgtEl>
+                                          <p:spTgt spid="6"/>
+                                        </p:tgtEl>
+                                        <p:attrNameLst>
+                                          <p:attrName>style.visibility</p:attrName>
+                                        </p:attrNameLst>
+                                      </p:cBhvr>
+                                      <p:to>
+                                        <p:strVal val="visible"/>
+                                      </p:to>
+                                    </p:set>
+                                  </p:childTnLst>
+                                </p:cTn>
+                              </p:par>
+                            </p:childTnLst>
+                          </p:cTn>
+                        </p:par>
+                      </p:childTnLst>
+                    </p:cTn>
+                  </p:par>
+                </p:childTnLst>
+              </p:cTn>
+              <p:prevCondLst>
+                <p:cond evt="onPrev" delay="0">
+                  <p:tgtEl>
+                    <p:sldTgt/>
+                  </p:tgtEl>
+                </p:cond>
+              </p:prevCondLst>
+              <p:nextCondLst>
+                <p:cond evt="onNext" delay="0">
+                  <p:tgtEl>
+                    <p:sldTgt/>
+                  </p:tgtEl>
+                </p:cond>
+              </p:nextCondLst>
+            </p:seq>
+          </p:childTnLst>
+        </p:cTn>
+      </p:par>
+    </p:tnLst>
+    <p:bldLst>
+      <p:bldP spid="6" grpId="0"/>
+    </p:bldLst>
+  </p:timing>
 </p:sld>
 </file>
 
@@ -33624,7 +33810,7 @@
             <a:pPr eaLnBrk="1" hangingPunct="1"/>
             <a:r>
               <a:rPr lang="en-US" altLang="en-US" dirty="0"/>
-              <a:t>Division hardware</a:t>
+              <a:t>Sequential division</a:t>
             </a:r>
             <a:endParaRPr lang="en-AU" altLang="en-US" dirty="0"/>
           </a:p>

</xml_diff>